<commit_message>
edit slide presentation #22
</commit_message>
<xml_diff>
--- a/document/Group-4.pptx
+++ b/document/Group-4.pptx
@@ -5,17 +5,18 @@
     <p:sldMasterId id="2147483648" r:id="rId1"/>
   </p:sldMasterIdLst>
   <p:notesMasterIdLst>
-    <p:notesMasterId r:id="rId10"/>
+    <p:notesMasterId r:id="rId11"/>
   </p:notesMasterIdLst>
   <p:sldIdLst>
     <p:sldId id="256" r:id="rId2"/>
     <p:sldId id="257" r:id="rId3"/>
     <p:sldId id="312" r:id="rId4"/>
     <p:sldId id="311" r:id="rId5"/>
-    <p:sldId id="308" r:id="rId6"/>
-    <p:sldId id="309" r:id="rId7"/>
-    <p:sldId id="313" r:id="rId8"/>
-    <p:sldId id="307" r:id="rId9"/>
+    <p:sldId id="314" r:id="rId6"/>
+    <p:sldId id="308" r:id="rId7"/>
+    <p:sldId id="309" r:id="rId8"/>
+    <p:sldId id="313" r:id="rId9"/>
+    <p:sldId id="307" r:id="rId10"/>
   </p:sldIdLst>
   <p:sldSz cx="9144000" cy="5143500" type="screen16x9"/>
   <p:notesSz cx="6858000" cy="9144000"/>
@@ -264,7 +265,7 @@
       </p15:sldGuideLst>
     </p:ext>
     <p:ext uri="http://customooxmlschemas.google.com/">
-      <go:slidesCustomData xmlns="" xmlns:mc="http://schemas.openxmlformats.org/markup-compatibility/2006" xmlns:mv="urn:schemas-microsoft-com:mac:vml" xmlns:c="http://schemas.openxmlformats.org/drawingml/2006/chart" xmlns:dgm="http://schemas.openxmlformats.org/drawingml/2006/diagram" xmlns:o="urn:schemas-microsoft-com:office:office" xmlns:v="urn:schemas-microsoft-com:vml" xmlns:pvml="urn:schemas-microsoft-com:office:powerpoint" xmlns:com="http://schemas.openxmlformats.org/drawingml/2006/compatibility" xmlns:p14="http://schemas.microsoft.com/office/powerpoint/2010/main" xmlns:p15="http://schemas.microsoft.com/office/powerpoint/2012/main" xmlns:ahyp="http://schemas.microsoft.com/office/drawing/2018/hyperlinkcolor" xmlns:go="http://customooxmlschemas.google.com/" r:id="rId59" roundtripDataSignature="AMtx7miqmFmwmmnnhKKD8A9KI2YXVtreog=="/>
+      <go:slidesCustomData xmlns:go="http://customooxmlschemas.google.com/" xmlns:ahyp="http://schemas.microsoft.com/office/drawing/2018/hyperlinkcolor" xmlns:p15="http://schemas.microsoft.com/office/powerpoint/2012/main" xmlns:p14="http://schemas.microsoft.com/office/powerpoint/2010/main" xmlns:com="http://schemas.openxmlformats.org/drawingml/2006/compatibility" xmlns:pvml="urn:schemas-microsoft-com:office:powerpoint" xmlns:v="urn:schemas-microsoft-com:vml" xmlns:o="urn:schemas-microsoft-com:office:office" xmlns:dgm="http://schemas.openxmlformats.org/drawingml/2006/diagram" xmlns:c="http://schemas.openxmlformats.org/drawingml/2006/chart" xmlns:mv="urn:schemas-microsoft-com:mac:vml" xmlns:mc="http://schemas.openxmlformats.org/markup-compatibility/2006" xmlns="" r:id="rId59" roundtripDataSignature="AMtx7miqmFmwmmnnhKKD8A9KI2YXVtreog=="/>
     </p:ext>
   </p:extLst>
 </p:presentation>
@@ -28842,7 +28843,7 @@
         <p:spPr>
           <a:xfrm>
             <a:off x="671600" y="1649576"/>
-            <a:ext cx="621999" cy="1507765"/>
+            <a:ext cx="621999" cy="1445463"/>
           </a:xfrm>
           <a:prstGeom prst="rect">
             <a:avLst/>
@@ -29911,8 +29912,8 @@
         </p:nvSpPr>
         <p:spPr>
           <a:xfrm>
-            <a:off x="2484743" y="288662"/>
-            <a:ext cx="5340820" cy="523220"/>
+            <a:off x="2257778" y="288662"/>
+            <a:ext cx="5567785" cy="523220"/>
           </a:xfrm>
           <a:prstGeom prst="rect">
             <a:avLst/>
@@ -29930,7 +29931,7 @@
                 <a:latin typeface="Verdana" panose="020B0604030504040204" pitchFamily="34" charset="0"/>
                 <a:ea typeface="Verdana" panose="020B0604030504040204" pitchFamily="34" charset="0"/>
               </a:rPr>
-              <a:t>The database structure </a:t>
+              <a:t>The database structure (ERD) </a:t>
             </a:r>
           </a:p>
         </p:txBody>
@@ -29957,7 +29958,7 @@
         </p:blipFill>
         <p:spPr>
           <a:xfrm>
-            <a:off x="297713" y="811882"/>
+            <a:off x="292396" y="811882"/>
             <a:ext cx="8559208" cy="4164155"/>
           </a:xfrm>
           <a:prstGeom prst="rect">
@@ -29965,6 +29966,61 @@
           </a:prstGeom>
         </p:spPr>
       </p:pic>
+      <p:sp>
+        <p:nvSpPr>
+          <p:cNvPr id="4" name="Rectangle 3">
+            <a:extLst>
+              <a:ext uri="{FF2B5EF4-FFF2-40B4-BE49-F238E27FC236}">
+                <a16:creationId xmlns:a16="http://schemas.microsoft.com/office/drawing/2014/main" id="{F30662B9-2E47-41E8-873E-5753A238D0C0}"/>
+              </a:ext>
+            </a:extLst>
+          </p:cNvPr>
+          <p:cNvSpPr/>
+          <p:nvPr/>
+        </p:nvSpPr>
+        <p:spPr>
+          <a:xfrm rot="18956721">
+            <a:off x="-541961" y="259567"/>
+            <a:ext cx="1828800" cy="581411"/>
+          </a:xfrm>
+          <a:prstGeom prst="rect">
+            <a:avLst/>
+          </a:prstGeom>
+          <a:ln>
+            <a:noFill/>
+          </a:ln>
+        </p:spPr>
+        <p:style>
+          <a:lnRef idx="2">
+            <a:schemeClr val="accent1">
+              <a:shade val="50000"/>
+            </a:schemeClr>
+          </a:lnRef>
+          <a:fillRef idx="1">
+            <a:schemeClr val="accent1"/>
+          </a:fillRef>
+          <a:effectRef idx="0">
+            <a:schemeClr val="accent1"/>
+          </a:effectRef>
+          <a:fontRef idx="minor">
+            <a:schemeClr val="lt1"/>
+          </a:fontRef>
+        </p:style>
+        <p:txBody>
+          <a:bodyPr rtlCol="0" anchor="ctr"/>
+          <a:lstStyle/>
+          <a:p>
+            <a:pPr algn="ctr"/>
+            <a:r>
+              <a:rPr lang="en-US" sz="2800" dirty="0">
+                <a:latin typeface="Verdana" panose="020B0604030504040204" pitchFamily="34" charset="0"/>
+                <a:ea typeface="Verdana" panose="020B0604030504040204" pitchFamily="34" charset="0"/>
+              </a:rPr>
+              <a:t>Tim</a:t>
+            </a:r>
+          </a:p>
+        </p:txBody>
+      </p:sp>
     </p:spTree>
     <p:extLst>
       <p:ext uri="{BB962C8B-B14F-4D97-AF65-F5344CB8AC3E}">
@@ -30098,6 +30154,61 @@
           </a:p>
         </p:txBody>
       </p:sp>
+      <p:sp>
+        <p:nvSpPr>
+          <p:cNvPr id="5" name="Rectangle 4">
+            <a:extLst>
+              <a:ext uri="{FF2B5EF4-FFF2-40B4-BE49-F238E27FC236}">
+                <a16:creationId xmlns:a16="http://schemas.microsoft.com/office/drawing/2014/main" id="{8C410748-45AB-40BC-8C01-5B1B858E28BE}"/>
+              </a:ext>
+            </a:extLst>
+          </p:cNvPr>
+          <p:cNvSpPr/>
+          <p:nvPr/>
+        </p:nvSpPr>
+        <p:spPr>
+          <a:xfrm rot="18956721">
+            <a:off x="-541961" y="259567"/>
+            <a:ext cx="1828800" cy="581411"/>
+          </a:xfrm>
+          <a:prstGeom prst="rect">
+            <a:avLst/>
+          </a:prstGeom>
+          <a:ln>
+            <a:noFill/>
+          </a:ln>
+        </p:spPr>
+        <p:style>
+          <a:lnRef idx="2">
+            <a:schemeClr val="accent1">
+              <a:shade val="50000"/>
+            </a:schemeClr>
+          </a:lnRef>
+          <a:fillRef idx="1">
+            <a:schemeClr val="accent1"/>
+          </a:fillRef>
+          <a:effectRef idx="0">
+            <a:schemeClr val="accent1"/>
+          </a:effectRef>
+          <a:fontRef idx="minor">
+            <a:schemeClr val="lt1"/>
+          </a:fontRef>
+        </p:style>
+        <p:txBody>
+          <a:bodyPr rtlCol="0" anchor="ctr"/>
+          <a:lstStyle/>
+          <a:p>
+            <a:pPr algn="ctr"/>
+            <a:r>
+              <a:rPr lang="en-US" sz="2800" dirty="0">
+                <a:latin typeface="Verdana" panose="020B0604030504040204" pitchFamily="34" charset="0"/>
+                <a:ea typeface="Verdana" panose="020B0604030504040204" pitchFamily="34" charset="0"/>
+              </a:rPr>
+              <a:t>Tim</a:t>
+            </a:r>
+          </a:p>
+        </p:txBody>
+      </p:sp>
     </p:spTree>
     <p:extLst>
       <p:ext uri="{BB962C8B-B14F-4D97-AF65-F5344CB8AC3E}">
@@ -30112,6 +30223,159 @@
 </file>
 
 <file path=ppt/slides/slide5.xml><?xml version="1.0" encoding="utf-8"?>
+<p:sld xmlns:a="http://schemas.openxmlformats.org/drawingml/2006/main" xmlns:r="http://schemas.openxmlformats.org/officeDocument/2006/relationships" xmlns:p="http://schemas.openxmlformats.org/presentationml/2006/main">
+  <p:cSld>
+    <p:spTree>
+      <p:nvGrpSpPr>
+        <p:cNvPr id="1" name=""/>
+        <p:cNvGrpSpPr/>
+        <p:nvPr/>
+      </p:nvGrpSpPr>
+      <p:grpSpPr>
+        <a:xfrm>
+          <a:off x="0" y="0"/>
+          <a:ext cx="0" cy="0"/>
+          <a:chOff x="0" y="0"/>
+          <a:chExt cx="0" cy="0"/>
+        </a:xfrm>
+      </p:grpSpPr>
+      <p:sp>
+        <p:nvSpPr>
+          <p:cNvPr id="2" name="TextBox 1">
+            <a:extLst>
+              <a:ext uri="{FF2B5EF4-FFF2-40B4-BE49-F238E27FC236}">
+                <a16:creationId xmlns:a16="http://schemas.microsoft.com/office/drawing/2014/main" id="{8FC50507-1B83-4BDF-B392-6D26E5F66654}"/>
+              </a:ext>
+            </a:extLst>
+          </p:cNvPr>
+          <p:cNvSpPr txBox="1"/>
+          <p:nvPr/>
+        </p:nvSpPr>
+        <p:spPr>
+          <a:xfrm>
+            <a:off x="3072809" y="142008"/>
+            <a:ext cx="3444949" cy="646331"/>
+          </a:xfrm>
+          <a:prstGeom prst="rect">
+            <a:avLst/>
+          </a:prstGeom>
+          <a:noFill/>
+        </p:spPr>
+        <p:txBody>
+          <a:bodyPr wrap="square" rtlCol="0">
+            <a:spAutoFit/>
+          </a:bodyPr>
+          <a:lstStyle/>
+          <a:p>
+            <a:r>
+              <a:rPr lang="en-US" sz="3600" dirty="0">
+                <a:latin typeface="Verdana" panose="020B0604030504040204" pitchFamily="34" charset="0"/>
+                <a:ea typeface="Verdana" panose="020B0604030504040204" pitchFamily="34" charset="0"/>
+              </a:rPr>
+              <a:t>PHP Structure</a:t>
+            </a:r>
+          </a:p>
+        </p:txBody>
+      </p:sp>
+      <p:pic>
+        <p:nvPicPr>
+          <p:cNvPr id="4" name="Picture 3">
+            <a:extLst>
+              <a:ext uri="{FF2B5EF4-FFF2-40B4-BE49-F238E27FC236}">
+                <a16:creationId xmlns:a16="http://schemas.microsoft.com/office/drawing/2014/main" id="{FE7CD41E-5BA6-4CA2-8712-4EC281320451}"/>
+              </a:ext>
+            </a:extLst>
+          </p:cNvPr>
+          <p:cNvPicPr>
+            <a:picLocks noChangeAspect="1"/>
+          </p:cNvPicPr>
+          <p:nvPr/>
+        </p:nvPicPr>
+        <p:blipFill>
+          <a:blip r:embed="rId2"/>
+          <a:stretch>
+            <a:fillRect/>
+          </a:stretch>
+        </p:blipFill>
+        <p:spPr>
+          <a:xfrm>
+            <a:off x="802759" y="1010092"/>
+            <a:ext cx="7538482" cy="3636336"/>
+          </a:xfrm>
+          <a:prstGeom prst="rect">
+            <a:avLst/>
+          </a:prstGeom>
+        </p:spPr>
+      </p:pic>
+      <p:sp>
+        <p:nvSpPr>
+          <p:cNvPr id="5" name="Rectangle 4">
+            <a:extLst>
+              <a:ext uri="{FF2B5EF4-FFF2-40B4-BE49-F238E27FC236}">
+                <a16:creationId xmlns:a16="http://schemas.microsoft.com/office/drawing/2014/main" id="{3E53CCC3-0233-4E25-B69A-59B3A71735A1}"/>
+              </a:ext>
+            </a:extLst>
+          </p:cNvPr>
+          <p:cNvSpPr/>
+          <p:nvPr/>
+        </p:nvSpPr>
+        <p:spPr>
+          <a:xfrm rot="18956721">
+            <a:off x="-541961" y="259567"/>
+            <a:ext cx="1828800" cy="581411"/>
+          </a:xfrm>
+          <a:prstGeom prst="rect">
+            <a:avLst/>
+          </a:prstGeom>
+          <a:ln>
+            <a:noFill/>
+          </a:ln>
+        </p:spPr>
+        <p:style>
+          <a:lnRef idx="2">
+            <a:schemeClr val="accent1">
+              <a:shade val="50000"/>
+            </a:schemeClr>
+          </a:lnRef>
+          <a:fillRef idx="1">
+            <a:schemeClr val="accent1"/>
+          </a:fillRef>
+          <a:effectRef idx="0">
+            <a:schemeClr val="accent1"/>
+          </a:effectRef>
+          <a:fontRef idx="minor">
+            <a:schemeClr val="lt1"/>
+          </a:fontRef>
+        </p:style>
+        <p:txBody>
+          <a:bodyPr rtlCol="0" anchor="ctr"/>
+          <a:lstStyle/>
+          <a:p>
+            <a:pPr algn="ctr"/>
+            <a:r>
+              <a:rPr lang="en-US" sz="2800" dirty="0">
+                <a:latin typeface="Verdana" panose="020B0604030504040204" pitchFamily="34" charset="0"/>
+                <a:ea typeface="Verdana" panose="020B0604030504040204" pitchFamily="34" charset="0"/>
+              </a:rPr>
+              <a:t>Tim</a:t>
+            </a:r>
+          </a:p>
+        </p:txBody>
+      </p:sp>
+    </p:spTree>
+    <p:extLst>
+      <p:ext uri="{BB962C8B-B14F-4D97-AF65-F5344CB8AC3E}">
+        <p14:creationId xmlns:p14="http://schemas.microsoft.com/office/powerpoint/2010/main" val="2013392585"/>
+      </p:ext>
+    </p:extLst>
+  </p:cSld>
+  <p:clrMapOvr>
+    <a:masterClrMapping/>
+  </p:clrMapOvr>
+</p:sld>
+</file>
+
+<file path=ppt/slides/slide6.xml><?xml version="1.0" encoding="utf-8"?>
 <p:sld xmlns:a="http://schemas.openxmlformats.org/drawingml/2006/main" xmlns:r="http://schemas.openxmlformats.org/officeDocument/2006/relationships" xmlns:p="http://schemas.openxmlformats.org/presentationml/2006/main">
   <p:cSld>
     <p:spTree>
@@ -30512,6 +30776,65 @@
           </a:fontRef>
         </p:style>
       </p:cxnSp>
+      <p:sp>
+        <p:nvSpPr>
+          <p:cNvPr id="9" name="Rectangle 8">
+            <a:extLst>
+              <a:ext uri="{FF2B5EF4-FFF2-40B4-BE49-F238E27FC236}">
+                <a16:creationId xmlns:a16="http://schemas.microsoft.com/office/drawing/2014/main" id="{7C90206A-D94A-4DCC-A908-A94597008935}"/>
+              </a:ext>
+            </a:extLst>
+          </p:cNvPr>
+          <p:cNvSpPr/>
+          <p:nvPr/>
+        </p:nvSpPr>
+        <p:spPr>
+          <a:xfrm rot="18956721">
+            <a:off x="-541961" y="259567"/>
+            <a:ext cx="1828800" cy="581411"/>
+          </a:xfrm>
+          <a:prstGeom prst="rect">
+            <a:avLst/>
+          </a:prstGeom>
+          <a:ln>
+            <a:noFill/>
+          </a:ln>
+        </p:spPr>
+        <p:style>
+          <a:lnRef idx="2">
+            <a:schemeClr val="accent1">
+              <a:shade val="50000"/>
+            </a:schemeClr>
+          </a:lnRef>
+          <a:fillRef idx="1">
+            <a:schemeClr val="accent1"/>
+          </a:fillRef>
+          <a:effectRef idx="0">
+            <a:schemeClr val="accent1"/>
+          </a:effectRef>
+          <a:fontRef idx="minor">
+            <a:schemeClr val="lt1"/>
+          </a:fontRef>
+        </p:style>
+        <p:txBody>
+          <a:bodyPr rtlCol="0" anchor="ctr"/>
+          <a:lstStyle/>
+          <a:p>
+            <a:pPr algn="ctr"/>
+            <a:r>
+              <a:rPr lang="en-US" sz="2800" dirty="0" err="1">
+                <a:latin typeface="Verdana" panose="020B0604030504040204" pitchFamily="34" charset="0"/>
+                <a:ea typeface="Verdana" panose="020B0604030504040204" pitchFamily="34" charset="0"/>
+              </a:rPr>
+              <a:t>Sauth</a:t>
+            </a:r>
+            <a:endParaRPr lang="en-US" sz="2800" dirty="0">
+              <a:latin typeface="Verdana" panose="020B0604030504040204" pitchFamily="34" charset="0"/>
+              <a:ea typeface="Verdana" panose="020B0604030504040204" pitchFamily="34" charset="0"/>
+            </a:endParaRPr>
+          </a:p>
+        </p:txBody>
+      </p:sp>
     </p:spTree>
     <p:extLst>
       <p:ext uri="{BB962C8B-B14F-4D97-AF65-F5344CB8AC3E}">
@@ -30525,7 +30848,7 @@
 </p:sld>
 </file>
 
-<file path=ppt/slides/slide6.xml><?xml version="1.0" encoding="utf-8"?>
+<file path=ppt/slides/slide7.xml><?xml version="1.0" encoding="utf-8"?>
 <p:sld xmlns:a="http://schemas.openxmlformats.org/drawingml/2006/main" xmlns:r="http://schemas.openxmlformats.org/officeDocument/2006/relationships" xmlns:p="http://schemas.openxmlformats.org/presentationml/2006/main">
   <p:cSld>
     <p:spTree>
@@ -30661,10 +30984,13 @@
                 <a:spcPct val="200000"/>
               </a:lnSpc>
             </a:pPr>
-            <a:endParaRPr lang="en-US" sz="2000" dirty="0">
-              <a:latin typeface="Verdana" panose="020B0604030504040204" pitchFamily="34" charset="0"/>
-              <a:ea typeface="Verdana" panose="020B0604030504040204" pitchFamily="34" charset="0"/>
-            </a:endParaRPr>
+            <a:r>
+              <a:rPr lang="en-US" sz="2000" dirty="0">
+                <a:latin typeface="Verdana" panose="020B0604030504040204" pitchFamily="34" charset="0"/>
+                <a:ea typeface="Verdana" panose="020B0604030504040204" pitchFamily="34" charset="0"/>
+              </a:rPr>
+              <a:t>	Design quality template</a:t>
+            </a:r>
           </a:p>
           <a:p>
             <a:endParaRPr lang="en-US" sz="2000" dirty="0"/>
@@ -30686,9 +31012,9 @@
         <p:grpSpPr>
           <a:xfrm>
             <a:off x="1563476" y="1077632"/>
-            <a:ext cx="680484" cy="2764737"/>
+            <a:ext cx="680484" cy="3348768"/>
             <a:chOff x="1393355" y="1481669"/>
-            <a:chExt cx="680484" cy="2764737"/>
+            <a:chExt cx="680484" cy="3348768"/>
           </a:xfrm>
         </p:grpSpPr>
         <p:pic>
@@ -30916,7 +31242,111 @@
             </a:extLst>
           </p:spPr>
         </p:pic>
+        <p:pic>
+          <p:nvPicPr>
+            <p:cNvPr id="11" name="Picture 2" descr="vb.net - How to play a GIF animation to the last Frame, then stop the  animation? - Stack Overflow">
+              <a:extLst>
+                <a:ext uri="{FF2B5EF4-FFF2-40B4-BE49-F238E27FC236}">
+                  <a16:creationId xmlns:a16="http://schemas.microsoft.com/office/drawing/2014/main" id="{AEE44474-3578-47FD-8EB0-01E9DF1AAF24}"/>
+                </a:ext>
+              </a:extLst>
+            </p:cNvPr>
+            <p:cNvPicPr>
+              <a:picLocks noChangeAspect="1" noChangeArrowheads="1"/>
+            </p:cNvPicPr>
+            <p:nvPr/>
+          </p:nvPicPr>
+          <p:blipFill rotWithShape="1">
+            <a:blip r:embed="rId2">
+              <a:extLst>
+                <a:ext uri="{28A0092B-C50C-407E-A947-70E740481C1C}">
+                  <a14:useLocalDpi xmlns:a14="http://schemas.microsoft.com/office/drawing/2010/main" val="0"/>
+                </a:ext>
+              </a:extLst>
+            </a:blip>
+            <a:srcRect l="31889" t="25407" r="31000" b="25261"/>
+            <a:stretch/>
+          </p:blipFill>
+          <p:spPr bwMode="auto">
+            <a:xfrm>
+              <a:off x="1393355" y="4195370"/>
+              <a:ext cx="636974" cy="635067"/>
+            </a:xfrm>
+            <a:prstGeom prst="rect">
+              <a:avLst/>
+            </a:prstGeom>
+            <a:noFill/>
+            <a:extLst>
+              <a:ext uri="{909E8E84-426E-40DD-AFC4-6F175D3DCCD1}">
+                <a14:hiddenFill xmlns:a14="http://schemas.microsoft.com/office/drawing/2010/main">
+                  <a:solidFill>
+                    <a:srgbClr val="FFFFFF"/>
+                  </a:solidFill>
+                </a14:hiddenFill>
+              </a:ext>
+            </a:extLst>
+          </p:spPr>
+        </p:pic>
       </p:grpSp>
+      <p:sp>
+        <p:nvSpPr>
+          <p:cNvPr id="12" name="Rectangle 11">
+            <a:extLst>
+              <a:ext uri="{FF2B5EF4-FFF2-40B4-BE49-F238E27FC236}">
+                <a16:creationId xmlns:a16="http://schemas.microsoft.com/office/drawing/2014/main" id="{DA2183BB-7628-416C-83FE-B1036A9B128B}"/>
+              </a:ext>
+            </a:extLst>
+          </p:cNvPr>
+          <p:cNvSpPr/>
+          <p:nvPr/>
+        </p:nvSpPr>
+        <p:spPr>
+          <a:xfrm rot="18956721">
+            <a:off x="-541961" y="259567"/>
+            <a:ext cx="1828800" cy="581411"/>
+          </a:xfrm>
+          <a:prstGeom prst="rect">
+            <a:avLst/>
+          </a:prstGeom>
+          <a:ln>
+            <a:noFill/>
+          </a:ln>
+        </p:spPr>
+        <p:style>
+          <a:lnRef idx="2">
+            <a:schemeClr val="accent1">
+              <a:shade val="50000"/>
+            </a:schemeClr>
+          </a:lnRef>
+          <a:fillRef idx="1">
+            <a:schemeClr val="accent1"/>
+          </a:fillRef>
+          <a:effectRef idx="0">
+            <a:schemeClr val="accent1"/>
+          </a:effectRef>
+          <a:fontRef idx="minor">
+            <a:schemeClr val="lt1"/>
+          </a:fontRef>
+        </p:style>
+        <p:txBody>
+          <a:bodyPr rtlCol="0" anchor="ctr"/>
+          <a:lstStyle/>
+          <a:p>
+            <a:pPr algn="ctr"/>
+            <a:r>
+              <a:rPr lang="en-US" sz="2800" dirty="0" err="1">
+                <a:latin typeface="Verdana" panose="020B0604030504040204" pitchFamily="34" charset="0"/>
+                <a:ea typeface="Verdana" panose="020B0604030504040204" pitchFamily="34" charset="0"/>
+              </a:rPr>
+              <a:t>Sauth</a:t>
+            </a:r>
+            <a:endParaRPr lang="en-US" sz="2800" dirty="0">
+              <a:latin typeface="Verdana" panose="020B0604030504040204" pitchFamily="34" charset="0"/>
+              <a:ea typeface="Verdana" panose="020B0604030504040204" pitchFamily="34" charset="0"/>
+            </a:endParaRPr>
+          </a:p>
+        </p:txBody>
+      </p:sp>
     </p:spTree>
     <p:extLst>
       <p:ext uri="{BB962C8B-B14F-4D97-AF65-F5344CB8AC3E}">
@@ -30930,7 +31360,7 @@
 </p:sld>
 </file>
 
-<file path=ppt/slides/slide7.xml><?xml version="1.0" encoding="utf-8"?>
+<file path=ppt/slides/slide8.xml><?xml version="1.0" encoding="utf-8"?>
 <p:sld xmlns:a="http://schemas.openxmlformats.org/drawingml/2006/main" xmlns:r="http://schemas.openxmlformats.org/officeDocument/2006/relationships" xmlns:p="http://schemas.openxmlformats.org/presentationml/2006/main">
   <p:cSld>
     <p:spTree>
@@ -31131,6 +31561,65 @@
           </p:spPr>
         </p:pic>
       </p:grpSp>
+      <p:sp>
+        <p:nvSpPr>
+          <p:cNvPr id="7" name="Rectangle 6">
+            <a:extLst>
+              <a:ext uri="{FF2B5EF4-FFF2-40B4-BE49-F238E27FC236}">
+                <a16:creationId xmlns:a16="http://schemas.microsoft.com/office/drawing/2014/main" id="{3C295462-6361-4447-B8A5-A88C477259E1}"/>
+              </a:ext>
+            </a:extLst>
+          </p:cNvPr>
+          <p:cNvSpPr/>
+          <p:nvPr/>
+        </p:nvSpPr>
+        <p:spPr>
+          <a:xfrm rot="18956721">
+            <a:off x="-541961" y="259567"/>
+            <a:ext cx="1828800" cy="581411"/>
+          </a:xfrm>
+          <a:prstGeom prst="rect">
+            <a:avLst/>
+          </a:prstGeom>
+          <a:ln>
+            <a:noFill/>
+          </a:ln>
+        </p:spPr>
+        <p:style>
+          <a:lnRef idx="2">
+            <a:schemeClr val="accent1">
+              <a:shade val="50000"/>
+            </a:schemeClr>
+          </a:lnRef>
+          <a:fillRef idx="1">
+            <a:schemeClr val="accent1"/>
+          </a:fillRef>
+          <a:effectRef idx="0">
+            <a:schemeClr val="accent1"/>
+          </a:effectRef>
+          <a:fontRef idx="minor">
+            <a:schemeClr val="lt1"/>
+          </a:fontRef>
+        </p:style>
+        <p:txBody>
+          <a:bodyPr rtlCol="0" anchor="ctr"/>
+          <a:lstStyle/>
+          <a:p>
+            <a:pPr algn="ctr"/>
+            <a:r>
+              <a:rPr lang="en-US" sz="2800" dirty="0" err="1">
+                <a:latin typeface="Verdana" panose="020B0604030504040204" pitchFamily="34" charset="0"/>
+                <a:ea typeface="Verdana" panose="020B0604030504040204" pitchFamily="34" charset="0"/>
+              </a:rPr>
+              <a:t>Sauth</a:t>
+            </a:r>
+            <a:endParaRPr lang="en-US" sz="2800" dirty="0">
+              <a:latin typeface="Verdana" panose="020B0604030504040204" pitchFamily="34" charset="0"/>
+              <a:ea typeface="Verdana" panose="020B0604030504040204" pitchFamily="34" charset="0"/>
+            </a:endParaRPr>
+          </a:p>
+        </p:txBody>
+      </p:sp>
     </p:spTree>
     <p:extLst>
       <p:ext uri="{BB962C8B-B14F-4D97-AF65-F5344CB8AC3E}">
@@ -31144,7 +31633,7 @@
 </p:sld>
 </file>
 
-<file path=ppt/slides/slide8.xml><?xml version="1.0" encoding="utf-8"?>
+<file path=ppt/slides/slide9.xml><?xml version="1.0" encoding="utf-8"?>
 <p:sld xmlns:a="http://schemas.openxmlformats.org/drawingml/2006/main" xmlns:r="http://schemas.openxmlformats.org/officeDocument/2006/relationships" xmlns:p="http://schemas.openxmlformats.org/presentationml/2006/main">
   <p:cSld>
     <p:spTree>

</xml_diff>